<commit_message>
DR solution updated in last page
</commit_message>
<xml_diff>
--- a/CustomerEngagements/beyondsoft/DR-Solution.pptx
+++ b/CustomerEngagements/beyondsoft/DR-Solution.pptx
@@ -12175,7 +12175,7 @@
           <p:nvPr>
             <p:extLst>
               <p:ext uri="{D42A27DB-BD31-4B8C-83A1-F6EECF244321}">
-                <p14:modId xmlns:p14="http://schemas.microsoft.com/office/powerpoint/2010/main" val="2882151821"/>
+                <p14:modId xmlns:p14="http://schemas.microsoft.com/office/powerpoint/2010/main" val="1126950200"/>
               </p:ext>
             </p:extLst>
           </p:nvPr>
@@ -12191,21 +12191,21 @@
                 <a:tableStyleId>{5C22544A-7EE6-4342-B048-85BDC9FD1C3A}</a:tableStyleId>
               </a:tblPr>
               <a:tblGrid>
-                <a:gridCol w="7156027">
+                <a:gridCol w="5500914">
                   <a:extLst>
                     <a:ext uri="{9D8B030D-6E8A-4147-A177-3AD203B41FA5}">
                       <a16:colId xmlns:a16="http://schemas.microsoft.com/office/drawing/2014/main" val="1330232464"/>
                     </a:ext>
                   </a:extLst>
                 </a:gridCol>
-                <a:gridCol w="7156027">
+                <a:gridCol w="5152572">
                   <a:extLst>
                     <a:ext uri="{9D8B030D-6E8A-4147-A177-3AD203B41FA5}">
                       <a16:colId xmlns:a16="http://schemas.microsoft.com/office/drawing/2014/main" val="3644617438"/>
                     </a:ext>
                   </a:extLst>
                 </a:gridCol>
-                <a:gridCol w="7156027">
+                <a:gridCol w="10814595">
                   <a:extLst>
                     <a:ext uri="{9D8B030D-6E8A-4147-A177-3AD203B41FA5}">
                       <a16:colId xmlns:a16="http://schemas.microsoft.com/office/drawing/2014/main" val="3453447567"/>
@@ -12236,7 +12236,7 @@
                       <a:pPr algn="ctr"/>
                       <a:r>
                         <a:rPr lang="en-IN" dirty="0"/>
-                        <a:t>Backend</a:t>
+                        <a:t>Api Engineer</a:t>
                       </a:r>
                     </a:p>
                   </a:txBody>
@@ -12250,7 +12250,7 @@
                       <a:pPr algn="ctr"/>
                       <a:r>
                         <a:rPr lang="en-IN" dirty="0"/>
-                        <a:t>Frontend</a:t>
+                        <a:t>Key Activities</a:t>
                       </a:r>
                     </a:p>
                   </a:txBody>
@@ -12283,7 +12283,10 @@
                     <a:lstStyle/>
                     <a:p>
                       <a:pPr algn="ctr"/>
-                      <a:endParaRPr lang="en-IN" dirty="0"/>
+                      <a:r>
+                        <a:rPr lang="en-IN" dirty="0"/>
+                        <a:t>2</a:t>
+                      </a:r>
                     </a:p>
                   </a:txBody>
                   <a:tcPr anchor="ctr"/>
@@ -12294,7 +12297,17 @@
                     <a:lstStyle/>
                     <a:p>
                       <a:pPr algn="ctr"/>
-                      <a:endParaRPr lang="en-IN" dirty="0"/>
+                      <a:r>
+                        <a:rPr lang="en-IN" dirty="0"/>
+                        <a:t>Open Api specification / Data Design +</a:t>
+                      </a:r>
+                    </a:p>
+                    <a:p>
+                      <a:pPr algn="ctr"/>
+                      <a:r>
+                        <a:rPr lang="en-IN" dirty="0"/>
+                        <a:t>Spring Boot Api’s + GitOps </a:t>
+                      </a:r>
                     </a:p>
                   </a:txBody>
                   <a:tcPr anchor="ctr"/>
@@ -12326,7 +12339,10 @@
                     <a:lstStyle/>
                     <a:p>
                       <a:pPr algn="ctr"/>
-                      <a:endParaRPr lang="en-IN" dirty="0"/>
+                      <a:r>
+                        <a:rPr lang="en-IN" dirty="0"/>
+                        <a:t>1</a:t>
+                      </a:r>
                     </a:p>
                   </a:txBody>
                   <a:tcPr anchor="ctr"/>
@@ -12337,7 +12353,10 @@
                     <a:lstStyle/>
                     <a:p>
                       <a:pPr algn="ctr"/>
-                      <a:endParaRPr lang="en-IN" dirty="0"/>
+                      <a:r>
+                        <a:rPr lang="en-IN" dirty="0"/>
+                        <a:t>User/Role/Group/Transaction/ Session / Authentication/ MFA / Activity Logs</a:t>
+                      </a:r>
                     </a:p>
                   </a:txBody>
                   <a:tcPr anchor="ctr"/>
@@ -12355,7 +12374,10 @@
                     <a:lstStyle/>
                     <a:p>
                       <a:pPr algn="ctr"/>
-                      <a:endParaRPr lang="en-IN" dirty="0"/>
+                      <a:r>
+                        <a:rPr lang="en-IN" dirty="0"/>
+                        <a:t>Workflow</a:t>
+                      </a:r>
                     </a:p>
                   </a:txBody>
                   <a:tcPr anchor="ctr"/>
@@ -12366,7 +12388,10 @@
                     <a:lstStyle/>
                     <a:p>
                       <a:pPr algn="ctr"/>
-                      <a:endParaRPr lang="en-IN" dirty="0"/>
+                      <a:r>
+                        <a:rPr lang="en-IN" dirty="0"/>
+                        <a:t>3</a:t>
+                      </a:r>
                     </a:p>
                   </a:txBody>
                   <a:tcPr anchor="ctr"/>
@@ -12377,7 +12402,10 @@
                     <a:lstStyle/>
                     <a:p>
                       <a:pPr algn="ctr"/>
-                      <a:endParaRPr lang="en-IN" dirty="0"/>
+                      <a:r>
+                        <a:rPr lang="en-IN" dirty="0"/>
+                        <a:t>Automation flows using Aws steps and lambdas (Golang / node / python)</a:t>
+                      </a:r>
                     </a:p>
                   </a:txBody>
                   <a:tcPr anchor="ctr"/>
@@ -12395,7 +12423,10 @@
                     <a:lstStyle/>
                     <a:p>
                       <a:pPr algn="ctr"/>
-                      <a:endParaRPr lang="en-IN"/>
+                      <a:r>
+                        <a:rPr lang="en-IN" dirty="0"/>
+                        <a:t>Monitoring</a:t>
+                      </a:r>
                     </a:p>
                   </a:txBody>
                   <a:tcPr anchor="ctr"/>
@@ -12406,7 +12437,10 @@
                     <a:lstStyle/>
                     <a:p>
                       <a:pPr algn="ctr"/>
-                      <a:endParaRPr lang="en-IN"/>
+                      <a:r>
+                        <a:rPr lang="en-IN" dirty="0"/>
+                        <a:t>2</a:t>
+                      </a:r>
                     </a:p>
                   </a:txBody>
                   <a:tcPr anchor="ctr"/>
@@ -12417,7 +12451,10 @@
                     <a:lstStyle/>
                     <a:p>
                       <a:pPr algn="ctr"/>
-                      <a:endParaRPr lang="en-IN"/>
+                      <a:r>
+                        <a:rPr lang="en-IN" dirty="0"/>
+                        <a:t>Write routines for continuous data collection and implements algorithms deduce SLA’s</a:t>
+                      </a:r>
                     </a:p>
                   </a:txBody>
                   <a:tcPr anchor="ctr"/>
@@ -12435,7 +12472,10 @@
                     <a:lstStyle/>
                     <a:p>
                       <a:pPr algn="ctr"/>
-                      <a:endParaRPr lang="en-IN"/>
+                      <a:r>
+                        <a:rPr lang="en-IN" dirty="0"/>
+                        <a:t>Analytics</a:t>
+                      </a:r>
                     </a:p>
                   </a:txBody>
                   <a:tcPr anchor="ctr"/>
@@ -12446,7 +12486,10 @@
                     <a:lstStyle/>
                     <a:p>
                       <a:pPr algn="ctr"/>
-                      <a:endParaRPr lang="en-IN"/>
+                      <a:r>
+                        <a:rPr lang="en-IN" dirty="0"/>
+                        <a:t>2</a:t>
+                      </a:r>
                     </a:p>
                   </a:txBody>
                   <a:tcPr anchor="ctr"/>
@@ -12457,7 +12500,10 @@
                     <a:lstStyle/>
                     <a:p>
                       <a:pPr algn="ctr"/>
-                      <a:endParaRPr lang="en-IN"/>
+                      <a:r>
+                        <a:rPr lang="en-IN" dirty="0"/>
+                        <a:t>Write Reports and Analytics </a:t>
+                      </a:r>
                     </a:p>
                   </a:txBody>
                   <a:tcPr anchor="ctr"/>
@@ -12475,7 +12521,7 @@
                     <a:lstStyle/>
                     <a:p>
                       <a:pPr algn="ctr"/>
-                      <a:endParaRPr lang="en-IN"/>
+                      <a:endParaRPr lang="en-IN" dirty="0"/>
                     </a:p>
                   </a:txBody>
                   <a:tcPr anchor="ctr"/>

</xml_diff>